<commit_message>
Fix the layer diagrams
</commit_message>
<xml_diff>
--- a/figs/layerdiagram/proc_layers.pptx
+++ b/figs/layerdiagram/proc_layers.pptx
@@ -194,7 +194,7 @@
           <a:p>
             <a:fld id="{07B16EC3-3112-4C57-8C50-056D0133F47E}" type="datetimeFigureOut">
               <a:rPr lang="zh-CN" altLang="en-US" smtClean="0"/>
-              <a:t>5/5/14</a:t>
+              <a:t>9/26/16</a:t>
             </a:fld>
             <a:endParaRPr lang="zh-CN" altLang="en-US"/>
           </a:p>
@@ -728,7 +728,7 @@
             <a:fld id="{1D8BD707-D9CF-40AE-B4C6-C98DA3205C09}" type="datetimeFigureOut">
               <a:rPr lang="en-US" smtClean="0"/>
               <a:pPr/>
-              <a:t>5/5/14</a:t>
+              <a:t>9/26/16</a:t>
             </a:fld>
             <a:endParaRPr lang="en-US"/>
           </a:p>
@@ -895,7 +895,7 @@
             <a:fld id="{1D8BD707-D9CF-40AE-B4C6-C98DA3205C09}" type="datetimeFigureOut">
               <a:rPr lang="en-US" smtClean="0"/>
               <a:pPr/>
-              <a:t>5/5/14</a:t>
+              <a:t>9/26/16</a:t>
             </a:fld>
             <a:endParaRPr lang="en-US"/>
           </a:p>
@@ -1072,7 +1072,7 @@
             <a:fld id="{1D8BD707-D9CF-40AE-B4C6-C98DA3205C09}" type="datetimeFigureOut">
               <a:rPr lang="en-US" smtClean="0"/>
               <a:pPr/>
-              <a:t>5/5/14</a:t>
+              <a:t>9/26/16</a:t>
             </a:fld>
             <a:endParaRPr lang="en-US"/>
           </a:p>
@@ -1239,7 +1239,7 @@
             <a:fld id="{1D8BD707-D9CF-40AE-B4C6-C98DA3205C09}" type="datetimeFigureOut">
               <a:rPr lang="en-US" smtClean="0"/>
               <a:pPr/>
-              <a:t>5/5/14</a:t>
+              <a:t>9/26/16</a:t>
             </a:fld>
             <a:endParaRPr lang="en-US"/>
           </a:p>
@@ -1482,7 +1482,7 @@
             <a:fld id="{1D8BD707-D9CF-40AE-B4C6-C98DA3205C09}" type="datetimeFigureOut">
               <a:rPr lang="en-US" smtClean="0"/>
               <a:pPr/>
-              <a:t>5/5/14</a:t>
+              <a:t>9/26/16</a:t>
             </a:fld>
             <a:endParaRPr lang="en-US"/>
           </a:p>
@@ -1767,7 +1767,7 @@
             <a:fld id="{1D8BD707-D9CF-40AE-B4C6-C98DA3205C09}" type="datetimeFigureOut">
               <a:rPr lang="en-US" smtClean="0"/>
               <a:pPr/>
-              <a:t>5/5/14</a:t>
+              <a:t>9/26/16</a:t>
             </a:fld>
             <a:endParaRPr lang="en-US"/>
           </a:p>
@@ -2186,7 +2186,7 @@
             <a:fld id="{1D8BD707-D9CF-40AE-B4C6-C98DA3205C09}" type="datetimeFigureOut">
               <a:rPr lang="en-US" smtClean="0"/>
               <a:pPr/>
-              <a:t>5/5/14</a:t>
+              <a:t>9/26/16</a:t>
             </a:fld>
             <a:endParaRPr lang="en-US"/>
           </a:p>
@@ -2301,7 +2301,7 @@
             <a:fld id="{1D8BD707-D9CF-40AE-B4C6-C98DA3205C09}" type="datetimeFigureOut">
               <a:rPr lang="en-US" smtClean="0"/>
               <a:pPr/>
-              <a:t>5/5/14</a:t>
+              <a:t>9/26/16</a:t>
             </a:fld>
             <a:endParaRPr lang="en-US"/>
           </a:p>
@@ -2393,7 +2393,7 @@
             <a:fld id="{1D8BD707-D9CF-40AE-B4C6-C98DA3205C09}" type="datetimeFigureOut">
               <a:rPr lang="en-US" smtClean="0"/>
               <a:pPr/>
-              <a:t>5/5/14</a:t>
+              <a:t>9/26/16</a:t>
             </a:fld>
             <a:endParaRPr lang="en-US"/>
           </a:p>
@@ -2667,7 +2667,7 @@
             <a:fld id="{1D8BD707-D9CF-40AE-B4C6-C98DA3205C09}" type="datetimeFigureOut">
               <a:rPr lang="en-US" smtClean="0"/>
               <a:pPr/>
-              <a:t>5/5/14</a:t>
+              <a:t>9/26/16</a:t>
             </a:fld>
             <a:endParaRPr lang="en-US"/>
           </a:p>
@@ -2917,7 +2917,7 @@
             <a:fld id="{1D8BD707-D9CF-40AE-B4C6-C98DA3205C09}" type="datetimeFigureOut">
               <a:rPr lang="en-US" smtClean="0"/>
               <a:pPr/>
-              <a:t>5/5/14</a:t>
+              <a:t>9/26/16</a:t>
             </a:fld>
             <a:endParaRPr lang="en-US"/>
           </a:p>
@@ -3127,7 +3127,7 @@
             <a:fld id="{1D8BD707-D9CF-40AE-B4C6-C98DA3205C09}" type="datetimeFigureOut">
               <a:rPr lang="en-US" smtClean="0"/>
               <a:pPr/>
-              <a:t>5/5/14</a:t>
+              <a:t>9/26/16</a:t>
             </a:fld>
             <a:endParaRPr lang="en-US"/>
           </a:p>
@@ -16410,8 +16410,8 @@
         </p:nvCxnSpPr>
         <p:spPr>
           <a:xfrm flipH="1">
-            <a:off x="5829300" y="6940154"/>
-            <a:ext cx="914400" cy="152400"/>
+            <a:off x="5791200" y="6940154"/>
+            <a:ext cx="952500" cy="152400"/>
           </a:xfrm>
           <a:prstGeom prst="straightConnector1">
             <a:avLst/>
@@ -16601,7 +16601,11 @@
               </a:pPr>
               <a:r>
                 <a:rPr lang="en-US" sz="1400" dirty="0" err="1" smtClean="0"/>
-                <a:t>pmapinit</a:t>
+                <a:t>sm</a:t>
+              </a:r>
+              <a:r>
+                <a:rPr lang="en-US" sz="1400" dirty="0" err="1" smtClean="0"/>
+                <a:t>init</a:t>
               </a:r>
               <a:endParaRPr lang="en-US" sz="1400" dirty="0"/>
             </a:p>
@@ -16616,7 +16620,7 @@
           <p:spPr>
             <a:xfrm>
               <a:off x="4800600" y="8305800"/>
-              <a:ext cx="914400" cy="228600"/>
+              <a:ext cx="990600" cy="228600"/>
             </a:xfrm>
             <a:prstGeom prst="rect">
               <a:avLst/>
@@ -16670,7 +16674,7 @@
           <p:spPr>
             <a:xfrm>
               <a:off x="2971800" y="8305800"/>
-              <a:ext cx="1066800" cy="228600"/>
+              <a:ext cx="1143000" cy="228600"/>
             </a:xfrm>
             <a:prstGeom prst="rect">
               <a:avLst/>
@@ -16763,8 +16767,8 @@
         </p:nvCxnSpPr>
         <p:spPr>
           <a:xfrm flipH="1">
-            <a:off x="3848100" y="6635354"/>
-            <a:ext cx="914400" cy="457200"/>
+            <a:off x="3810000" y="6635354"/>
+            <a:ext cx="952500" cy="457200"/>
           </a:xfrm>
           <a:prstGeom prst="straightConnector1">
             <a:avLst/>
@@ -16803,8 +16807,8 @@
         </p:nvCxnSpPr>
         <p:spPr>
           <a:xfrm flipH="1">
-            <a:off x="4724400" y="6635354"/>
-            <a:ext cx="990600" cy="457200"/>
+            <a:off x="4686300" y="6635354"/>
+            <a:ext cx="1066800" cy="457200"/>
           </a:xfrm>
           <a:prstGeom prst="straightConnector1">
             <a:avLst/>
@@ -16844,7 +16848,7 @@
         <p:spPr>
           <a:xfrm flipH="1">
             <a:off x="6743700" y="6635354"/>
-            <a:ext cx="723900" cy="152400"/>
+            <a:ext cx="762000" cy="152400"/>
           </a:xfrm>
           <a:prstGeom prst="straightConnector1">
             <a:avLst/>
@@ -17087,7 +17091,11 @@
               </a:pPr>
               <a:r>
                 <a:rPr lang="en-US" sz="1400" dirty="0" err="1" smtClean="0"/>
-                <a:t>pmapinit</a:t>
+                <a:t>sm</a:t>
+              </a:r>
+              <a:r>
+                <a:rPr lang="en-US" sz="1400" dirty="0" err="1" smtClean="0"/>
+                <a:t>init</a:t>
               </a:r>
               <a:endParaRPr lang="en-US" sz="1400" dirty="0"/>
             </a:p>
@@ -17350,8 +17358,8 @@
         </p:nvCxnSpPr>
         <p:spPr>
           <a:xfrm flipH="1">
-            <a:off x="5715000" y="5873354"/>
-            <a:ext cx="723900" cy="457200"/>
+            <a:off x="5753100" y="5873354"/>
+            <a:ext cx="685800" cy="457200"/>
           </a:xfrm>
           <a:prstGeom prst="straightConnector1">
             <a:avLst/>
@@ -19929,7 +19937,7 @@
           <p:spPr>
             <a:xfrm>
               <a:off x="-76200" y="9677400"/>
-              <a:ext cx="838200" cy="304800"/>
+              <a:ext cx="762000" cy="304800"/>
             </a:xfrm>
             <a:prstGeom prst="rect">
               <a:avLst/>
@@ -19964,7 +19972,11 @@
               </a:pPr>
               <a:r>
                 <a:rPr lang="en-US" sz="1400" dirty="0" err="1" smtClean="0"/>
-                <a:t>pmapinit</a:t>
+                <a:t>sm</a:t>
+              </a:r>
+              <a:r>
+                <a:rPr lang="en-US" sz="1400" dirty="0" err="1" smtClean="0"/>
+                <a:t>init</a:t>
               </a:r>
               <a:endParaRPr lang="en-US" sz="1400" dirty="0"/>
             </a:p>
@@ -20571,8 +20583,8 @@
         </p:nvSpPr>
         <p:spPr>
           <a:xfrm>
-            <a:off x="4191000" y="7092554"/>
-            <a:ext cx="1066800" cy="304800"/>
+            <a:off x="4114800" y="7092554"/>
+            <a:ext cx="1143000" cy="304800"/>
           </a:xfrm>
           <a:prstGeom prst="rect">
             <a:avLst/>
@@ -20621,8 +20633,8 @@
         </p:nvSpPr>
         <p:spPr>
           <a:xfrm>
-            <a:off x="5257800" y="7092554"/>
-            <a:ext cx="1143000" cy="304800"/>
+            <a:off x="5181600" y="7092554"/>
+            <a:ext cx="1219200" cy="304800"/>
           </a:xfrm>
           <a:prstGeom prst="rect">
             <a:avLst/>
@@ -20750,7 +20762,7 @@
         <p:spPr>
           <a:xfrm>
             <a:off x="6438900" y="5873354"/>
-            <a:ext cx="1028700" cy="457200"/>
+            <a:ext cx="1066800" cy="457200"/>
           </a:xfrm>
           <a:prstGeom prst="straightConnector1">
             <a:avLst/>
@@ -21961,8 +21973,8 @@
         </p:nvSpPr>
         <p:spPr>
           <a:xfrm>
-            <a:off x="6629400" y="993577"/>
-            <a:ext cx="1295400" cy="304800"/>
+            <a:off x="6553200" y="993577"/>
+            <a:ext cx="1371600" cy="304800"/>
           </a:xfrm>
           <a:prstGeom prst="rect">
             <a:avLst/>
@@ -22164,7 +22176,7 @@
         <p:spPr>
           <a:xfrm flipH="1">
             <a:off x="6515100" y="1298377"/>
-            <a:ext cx="762000" cy="155377"/>
+            <a:ext cx="723900" cy="155377"/>
           </a:xfrm>
           <a:prstGeom prst="straightConnector1">
             <a:avLst/>
@@ -22317,7 +22329,7 @@
         <p:spPr>
           <a:xfrm>
             <a:off x="6743700" y="841177"/>
-            <a:ext cx="533400" cy="152400"/>
+            <a:ext cx="495300" cy="152400"/>
           </a:xfrm>
           <a:prstGeom prst="straightConnector1">
             <a:avLst/>
@@ -24014,7 +24026,7 @@
         <p:spPr>
           <a:xfrm>
             <a:off x="6248400" y="6330554"/>
-            <a:ext cx="762000" cy="304800"/>
+            <a:ext cx="838200" cy="304800"/>
           </a:xfrm>
           <a:prstGeom prst="rect">
             <a:avLst/>
@@ -24067,8 +24079,8 @@
         </p:nvSpPr>
         <p:spPr>
           <a:xfrm>
-            <a:off x="7162800" y="5568554"/>
-            <a:ext cx="762000" cy="304800"/>
+            <a:off x="7086600" y="5568554"/>
+            <a:ext cx="838200" cy="304800"/>
           </a:xfrm>
           <a:prstGeom prst="rect">
             <a:avLst/>
@@ -24124,8 +24136,8 @@
         </p:nvCxnSpPr>
         <p:spPr>
           <a:xfrm flipH="1">
-            <a:off x="6629400" y="5873354"/>
-            <a:ext cx="914400" cy="457200"/>
+            <a:off x="6667500" y="5873354"/>
+            <a:ext cx="838200" cy="457200"/>
           </a:xfrm>
           <a:prstGeom prst="straightConnector1">
             <a:avLst/>
@@ -24165,7 +24177,7 @@
         <p:spPr>
           <a:xfrm>
             <a:off x="6743700" y="5416154"/>
-            <a:ext cx="800100" cy="152400"/>
+            <a:ext cx="762000" cy="152400"/>
           </a:xfrm>
           <a:prstGeom prst="straightConnector1">
             <a:avLst/>
@@ -24267,14 +24279,21 @@
                 <a:latin typeface="Arial" pitchFamily="34" charset="0"/>
                 <a:cs typeface="Arial" pitchFamily="34" charset="0"/>
               </a:rPr>
-              <a:t>MPMap</a:t>
+              <a:t>MShare</a:t>
             </a:r>
             <a:r>
               <a:rPr lang="en-US" altLang="zh-CN" sz="1600" b="1" dirty="0" smtClean="0">
                 <a:latin typeface="Arial" pitchFamily="34" charset="0"/>
                 <a:cs typeface="Arial" pitchFamily="34" charset="0"/>
               </a:rPr>
-              <a:t> Layer</a:t>
+              <a:t> </a:t>
+            </a:r>
+            <a:r>
+              <a:rPr lang="en-US" altLang="zh-CN" sz="1600" b="1" dirty="0" smtClean="0">
+                <a:latin typeface="Arial" pitchFamily="34" charset="0"/>
+                <a:cs typeface="Arial" pitchFamily="34" charset="0"/>
+              </a:rPr>
+              <a:t>Layer</a:t>
             </a:r>
             <a:endParaRPr lang="zh-CN" altLang="en-US" sz="1600" b="1" dirty="0">
               <a:latin typeface="Arial" pitchFamily="34" charset="0"/>
@@ -24320,102 +24339,46 @@
               <a:t>PFInfo</a:t>
             </a:r>
             <a:r>
+              <a:rPr lang="en-US" altLang="zh-CN" sz="1400" dirty="0" err="1" smtClean="0">
+                <a:latin typeface="Arial" pitchFamily="34" charset="0"/>
+                <a:cs typeface="Arial" pitchFamily="34" charset="0"/>
+              </a:rPr>
+              <a:t>,iflags,AT,nps,cn,pmi</a:t>
+            </a:r>
+            <a:r>
+              <a:rPr lang="en-US" altLang="zh-CN" sz="1400" dirty="0" smtClean="0">
+                <a:latin typeface="Arial" pitchFamily="34" charset="0"/>
+                <a:cs typeface="Arial" pitchFamily="34" charset="0"/>
+              </a:rPr>
+              <a:t>, </a:t>
+            </a:r>
+            <a:r>
+              <a:rPr lang="en-US" altLang="zh-CN" sz="1400" dirty="0" err="1" smtClean="0">
+                <a:latin typeface="Arial" pitchFamily="34" charset="0"/>
+                <a:cs typeface="Arial" pitchFamily="34" charset="0"/>
+              </a:rPr>
+              <a:t>pmp</a:t>
+            </a:r>
+            <a:r>
               <a:rPr lang="en-US" altLang="zh-CN" sz="1400" dirty="0">
                 <a:latin typeface="Arial" pitchFamily="34" charset="0"/>
                 <a:cs typeface="Arial" pitchFamily="34" charset="0"/>
               </a:rPr>
-              <a:t>,</a:t>
-            </a:r>
-            <a:r>
-              <a:rPr lang="zh-CN" altLang="en-US" sz="1400" dirty="0">
-                <a:latin typeface="Arial" pitchFamily="34" charset="0"/>
-                <a:cs typeface="Arial" pitchFamily="34" charset="0"/>
-              </a:rPr>
-              <a:t> </a:t>
+              <a:t>, </a:t>
             </a:r>
             <a:r>
               <a:rPr lang="en-US" altLang="zh-CN" sz="1400" dirty="0" err="1">
                 <a:latin typeface="Arial" pitchFamily="34" charset="0"/>
                 <a:cs typeface="Arial" pitchFamily="34" charset="0"/>
               </a:rPr>
-              <a:t>iflags</a:t>
-            </a:r>
-            <a:r>
-              <a:rPr lang="en-US" altLang="zh-CN" sz="1400" dirty="0">
-                <a:latin typeface="Arial" pitchFamily="34" charset="0"/>
-                <a:cs typeface="Arial" pitchFamily="34" charset="0"/>
-              </a:rPr>
-              <a:t>,</a:t>
-            </a:r>
-            <a:r>
-              <a:rPr lang="zh-CN" altLang="en-US" sz="1400" dirty="0">
-                <a:latin typeface="Arial" pitchFamily="34" charset="0"/>
-                <a:cs typeface="Arial" pitchFamily="34" charset="0"/>
-              </a:rPr>
-              <a:t> </a:t>
-            </a:r>
-            <a:r>
-              <a:rPr lang="en-US" altLang="zh-CN" sz="1400" dirty="0">
-                <a:latin typeface="Arial" pitchFamily="34" charset="0"/>
-                <a:cs typeface="Arial" pitchFamily="34" charset="0"/>
-              </a:rPr>
-              <a:t>AT, </a:t>
-            </a:r>
-            <a:r>
-              <a:rPr lang="en-US" altLang="zh-CN" sz="1400" dirty="0" err="1">
-                <a:latin typeface="Arial" pitchFamily="34" charset="0"/>
-                <a:cs typeface="Arial" pitchFamily="34" charset="0"/>
-              </a:rPr>
-              <a:t>nps</a:t>
-            </a:r>
-            <a:r>
-              <a:rPr lang="en-US" altLang="zh-CN" sz="1400" dirty="0">
-                <a:latin typeface="Arial" pitchFamily="34" charset="0"/>
-                <a:cs typeface="Arial" pitchFamily="34" charset="0"/>
-              </a:rPr>
-              <a:t>,</a:t>
-            </a:r>
-            <a:r>
-              <a:rPr lang="zh-CN" altLang="en-US" sz="1400" dirty="0">
-                <a:latin typeface="Arial" pitchFamily="34" charset="0"/>
-                <a:cs typeface="Arial" pitchFamily="34" charset="0"/>
-              </a:rPr>
-              <a:t> </a:t>
+              <a:t>s</a:t>
             </a:r>
             <a:r>
               <a:rPr lang="en-US" altLang="zh-CN" sz="1400" dirty="0" err="1" smtClean="0">
                 <a:latin typeface="Arial" pitchFamily="34" charset="0"/>
                 <a:cs typeface="Arial" pitchFamily="34" charset="0"/>
               </a:rPr>
-              <a:t>pmi</a:t>
-            </a:r>
-            <a:r>
-              <a:rPr lang="en-US" altLang="zh-CN" sz="1400" dirty="0" smtClean="0">
-                <a:latin typeface="Arial" pitchFamily="34" charset="0"/>
-                <a:cs typeface="Arial" pitchFamily="34" charset="0"/>
-              </a:rPr>
-              <a:t>, </a:t>
-            </a:r>
-            <a:r>
-              <a:rPr lang="en-US" altLang="zh-CN" sz="1400" dirty="0" err="1" smtClean="0">
-                <a:latin typeface="Arial" pitchFamily="34" charset="0"/>
-                <a:cs typeface="Arial" pitchFamily="34" charset="0"/>
-              </a:rPr>
-              <a:t>pmp</a:t>
-            </a:r>
-            <a:r>
-              <a:rPr lang="en-US" altLang="zh-CN" sz="1400" dirty="0">
-                <a:latin typeface="Arial" pitchFamily="34" charset="0"/>
-                <a:cs typeface="Arial" pitchFamily="34" charset="0"/>
-              </a:rPr>
-              <a:t>, </a:t>
-            </a:r>
-            <a:r>
-              <a:rPr lang="en-US" altLang="zh-CN" sz="1400" dirty="0" err="1">
-                <a:latin typeface="Arial" pitchFamily="34" charset="0"/>
-                <a:cs typeface="Arial" pitchFamily="34" charset="0"/>
-              </a:rPr>
-              <a:t>bitm</a:t>
+              <a:t>m</a:t>
             </a:r>
             <a:r>
               <a:rPr lang="en-US" altLang="zh-CN" sz="1400" dirty="0">
@@ -24453,8 +24416,8 @@
           </p:nvSpPr>
           <p:spPr>
             <a:xfrm>
-              <a:off x="7696200" y="152400"/>
-              <a:ext cx="914400" cy="228600"/>
+              <a:off x="7620000" y="152400"/>
+              <a:ext cx="990600" cy="228600"/>
             </a:xfrm>
             <a:prstGeom prst="rect">
               <a:avLst/>
@@ -24507,8 +24470,8 @@
           </p:nvSpPr>
           <p:spPr>
             <a:xfrm>
-              <a:off x="6400800" y="152400"/>
-              <a:ext cx="685800" cy="228600"/>
+              <a:off x="6324600" y="152400"/>
+              <a:ext cx="762000" cy="228600"/>
             </a:xfrm>
             <a:prstGeom prst="rect">
               <a:avLst/>
@@ -24651,11 +24614,7 @@
               </a:pPr>
               <a:r>
                 <a:rPr lang="en-US" sz="1200" dirty="0" err="1" smtClean="0"/>
-                <a:t>PT_resv</a:t>
-              </a:r>
-              <a:r>
-                <a:rPr lang="en-US" sz="1200" dirty="0" smtClean="0"/>
-                <a:t>/read</a:t>
+                <a:t>PT_foo</a:t>
               </a:r>
               <a:endParaRPr lang="en-US" sz="1200" dirty="0"/>
             </a:p>
@@ -24708,7 +24667,11 @@
               </a:pPr>
               <a:r>
                 <a:rPr lang="en-US" sz="1400" dirty="0" err="1" smtClean="0"/>
-                <a:t>pmapinit</a:t>
+                <a:t>sm</a:t>
+              </a:r>
+              <a:r>
+                <a:rPr lang="en-US" sz="1400" dirty="0" err="1" smtClean="0"/>
+                <a:t>init</a:t>
               </a:r>
               <a:endParaRPr lang="en-US" sz="1400" dirty="0"/>
             </a:p>
@@ -24758,11 +24721,7 @@
               </a:pPr>
               <a:r>
                 <a:rPr lang="en-US" sz="1200" dirty="0" err="1" smtClean="0"/>
-                <a:t>PT_new</a:t>
-              </a:r>
-              <a:r>
-                <a:rPr lang="en-US" sz="1200" dirty="0" smtClean="0"/>
-                <a:t>/free</a:t>
+                <a:t>sm_foo</a:t>
               </a:r>
               <a:endParaRPr lang="en-US" sz="1200" dirty="0"/>
             </a:p>
@@ -24915,7 +24874,7 @@
         <p:spPr>
           <a:xfrm>
             <a:off x="6934200" y="7397354"/>
-            <a:ext cx="38100" cy="451246"/>
+            <a:ext cx="0" cy="451246"/>
           </a:xfrm>
           <a:prstGeom prst="straightConnector1">
             <a:avLst/>
@@ -24955,7 +24914,7 @@
         <p:spPr>
           <a:xfrm>
             <a:off x="6934200" y="7397354"/>
-            <a:ext cx="1447800" cy="451246"/>
+            <a:ext cx="1409700" cy="451246"/>
           </a:xfrm>
           <a:prstGeom prst="straightConnector1">
             <a:avLst/>
@@ -24995,7 +24954,7 @@
         <p:spPr>
           <a:xfrm flipH="1">
             <a:off x="4610100" y="7397354"/>
-            <a:ext cx="1219200" cy="451246"/>
+            <a:ext cx="1181100" cy="451246"/>
           </a:xfrm>
           <a:prstGeom prst="straightConnector1">
             <a:avLst/>
@@ -25034,8 +24993,8 @@
         </p:nvCxnSpPr>
         <p:spPr>
           <a:xfrm>
-            <a:off x="3848100" y="7397354"/>
-            <a:ext cx="0" cy="451246"/>
+            <a:off x="3810000" y="7397354"/>
+            <a:ext cx="38100" cy="451246"/>
           </a:xfrm>
           <a:prstGeom prst="straightConnector1">
             <a:avLst/>
@@ -25073,9 +25032,9 @@
           <p:nvPr/>
         </p:nvCxnSpPr>
         <p:spPr>
-          <a:xfrm flipH="1">
+          <a:xfrm>
             <a:off x="4686300" y="7397354"/>
-            <a:ext cx="38100" cy="146446"/>
+            <a:ext cx="0" cy="146446"/>
           </a:xfrm>
           <a:prstGeom prst="straightConnector1">
             <a:avLst/>

</xml_diff>